<commit_message>
Add name and date to slides.
</commit_message>
<xml_diff>
--- a/slides/QLS-MiCM Intermediate Python (Part 2) Workshop PPT.pptx
+++ b/slides/QLS-MiCM Intermediate Python (Part 2) Workshop PPT.pptx
@@ -12797,7 +12797,7 @@
           <a:p>
             <a:fld id="{9FF74AA5-8A3E-4FDB-94BB-BF4B31CB4E38}" type="datetimeFigureOut">
               <a:rPr lang="en-CA" smtClean="0"/>
-              <a:t>2024-10-20</a:t>
+              <a:t>2024-10-31</a:t>
             </a:fld>
             <a:endParaRPr lang="en-CA"/>
           </a:p>
@@ -12974,7 +12974,7 @@
           <a:p>
             <a:fld id="{217E5156-1B5D-054E-B5B2-E1B1BA160252}" type="datetimeFigureOut">
               <a:rPr lang="fr-FR" smtClean="0"/>
-              <a:t>20/10/2024</a:t>
+              <a:t>31/10/2024</a:t>
             </a:fld>
             <a:endParaRPr lang="fr-FR"/>
           </a:p>
@@ -15719,15 +15719,15 @@
               <a:rPr lang="en-CA" sz="1800" dirty="0">
                 <a:latin typeface="Helvetica Light"/>
               </a:rPr>
-              <a:t>Workshop Lead:</a:t>
+              <a:t>Benjamin Rudski</a:t>
             </a:r>
           </a:p>
           <a:p>
             <a:r>
-              <a:rPr lang="en-CA" sz="1800" dirty="0">
+              <a:rPr lang="en-CA" sz="1800">
                 <a:latin typeface="Helvetica Light"/>
               </a:rPr>
-              <a:t>Month Date, Year </a:t>
+              <a:t>November 1, 2024</a:t>
             </a:r>
             <a:endParaRPr lang="en-CA" dirty="0">
               <a:latin typeface="Helvetica Light"/>

</xml_diff>